<commit_message>
Updates to Plugfest Security
After plugfest preparation meeting.
</commit_message>
<xml_diff>
--- a/plugfest/2018-bundang/Security-Bundang-PlugFest-Preparation.pptx
+++ b/plugfest/2018-bundang/Security-Bundang-PlugFest-Preparation.pptx
@@ -14,6 +14,8 @@
     <p:sldId id="266" r:id="rId8"/>
     <p:sldId id="258" r:id="rId9"/>
     <p:sldId id="267" r:id="rId10"/>
+    <p:sldId id="268" r:id="rId11"/>
+    <p:sldId id="269" r:id="rId12"/>
   </p:sldIdLst>
   <p:sldSz cx="9144000" cy="6858000" type="screen4x3"/>
   <p:notesSz cx="6858000" cy="9144000"/>
@@ -3179,6 +3181,272 @@
 </p:sld>
 </file>
 
+<file path=ppt/slides/slide10.xml><?xml version="1.0" encoding="utf-8"?>
+<p:sld xmlns:a="http://schemas.openxmlformats.org/drawingml/2006/main" xmlns:r="http://schemas.openxmlformats.org/officeDocument/2006/relationships" xmlns:p="http://schemas.openxmlformats.org/presentationml/2006/main">
+  <p:cSld>
+    <p:spTree>
+      <p:nvGrpSpPr>
+        <p:cNvPr id="1" name=""/>
+        <p:cNvGrpSpPr/>
+        <p:nvPr/>
+      </p:nvGrpSpPr>
+      <p:grpSpPr>
+        <a:xfrm>
+          <a:off x="0" y="0"/>
+          <a:ext cx="0" cy="0"/>
+          <a:chOff x="0" y="0"/>
+          <a:chExt cx="0" cy="0"/>
+        </a:xfrm>
+      </p:grpSpPr>
+      <p:sp>
+        <p:nvSpPr>
+          <p:cNvPr id="2" name="Title 1"/>
+          <p:cNvSpPr>
+            <a:spLocks noGrp="1"/>
+          </p:cNvSpPr>
+          <p:nvPr>
+            <p:ph type="title"/>
+          </p:nvPr>
+        </p:nvSpPr>
+        <p:spPr/>
+        <p:txBody>
+          <a:bodyPr/>
+          <a:lstStyle/>
+          <a:p>
+            <a:r>
+              <a:rPr lang="en-US" dirty="0" smtClean="0"/>
+              <a:t>Other Topics</a:t>
+            </a:r>
+            <a:endParaRPr lang="en-US" dirty="0"/>
+          </a:p>
+        </p:txBody>
+      </p:sp>
+      <p:sp>
+        <p:nvSpPr>
+          <p:cNvPr id="3" name="Content Placeholder 2"/>
+          <p:cNvSpPr>
+            <a:spLocks noGrp="1"/>
+          </p:cNvSpPr>
+          <p:nvPr>
+            <p:ph idx="1"/>
+          </p:nvPr>
+        </p:nvSpPr>
+        <p:spPr>
+          <a:xfrm>
+            <a:off x="457200" y="1600200"/>
+            <a:ext cx="8229600" cy="5141168"/>
+          </a:xfrm>
+        </p:spPr>
+        <p:txBody>
+          <a:bodyPr>
+            <a:normAutofit lnSpcReduction="10000"/>
+          </a:bodyPr>
+          <a:lstStyle/>
+          <a:p>
+            <a:r>
+              <a:rPr lang="en-US" dirty="0" smtClean="0"/>
+              <a:t>Key Distribution:</a:t>
+            </a:r>
+          </a:p>
+          <a:p>
+            <a:pPr lvl="1"/>
+            <a:r>
+              <a:rPr lang="en-US" dirty="0" smtClean="0"/>
+              <a:t>FIDO/OAuth</a:t>
+            </a:r>
+          </a:p>
+          <a:p>
+            <a:pPr lvl="1"/>
+            <a:r>
+              <a:rPr lang="en-US" dirty="0" smtClean="0"/>
+              <a:t>Kerberos</a:t>
+            </a:r>
+          </a:p>
+          <a:p>
+            <a:pPr lvl="1"/>
+            <a:r>
+              <a:rPr lang="en-US" dirty="0" err="1" smtClean="0"/>
+              <a:t>Preshared</a:t>
+            </a:r>
+            <a:r>
+              <a:rPr lang="en-US" dirty="0" smtClean="0"/>
+              <a:t> keys</a:t>
+            </a:r>
+          </a:p>
+          <a:p>
+            <a:r>
+              <a:rPr lang="en-US" dirty="0" smtClean="0"/>
+              <a:t>Certificates: what information can we include in a self-signed cert to make it </a:t>
+            </a:r>
+            <a:r>
+              <a:rPr lang="en-US" dirty="0" err="1" smtClean="0"/>
+              <a:t>validatible</a:t>
+            </a:r>
+            <a:r>
+              <a:rPr lang="en-US" dirty="0" smtClean="0"/>
+              <a:t>?</a:t>
+            </a:r>
+          </a:p>
+          <a:p>
+            <a:r>
+              <a:rPr lang="en-US" dirty="0" smtClean="0"/>
+              <a:t>Object security (See charter!  Required!)</a:t>
+            </a:r>
+          </a:p>
+          <a:p>
+            <a:pPr lvl="1"/>
+            <a:r>
+              <a:rPr lang="en-US" dirty="0" smtClean="0"/>
+              <a:t>COSE</a:t>
+            </a:r>
+          </a:p>
+          <a:p>
+            <a:r>
+              <a:rPr lang="en-US" dirty="0" smtClean="0"/>
+              <a:t>Access controls</a:t>
+            </a:r>
+          </a:p>
+          <a:p>
+            <a:pPr lvl="1"/>
+            <a:r>
+              <a:rPr lang="en-US" dirty="0" smtClean="0"/>
+              <a:t>ACL</a:t>
+            </a:r>
+            <a:endParaRPr lang="en-US" dirty="0"/>
+          </a:p>
+        </p:txBody>
+      </p:sp>
+    </p:spTree>
+    <p:extLst>
+      <p:ext uri="{BB962C8B-B14F-4D97-AF65-F5344CB8AC3E}">
+        <p14:creationId xmlns:p14="http://schemas.microsoft.com/office/powerpoint/2010/main" val="1808812472"/>
+      </p:ext>
+    </p:extLst>
+  </p:cSld>
+  <p:clrMapOvr>
+    <a:masterClrMapping/>
+  </p:clrMapOvr>
+</p:sld>
+</file>
+
+<file path=ppt/slides/slide11.xml><?xml version="1.0" encoding="utf-8"?>
+<p:sld xmlns:a="http://schemas.openxmlformats.org/drawingml/2006/main" xmlns:r="http://schemas.openxmlformats.org/officeDocument/2006/relationships" xmlns:p="http://schemas.openxmlformats.org/presentationml/2006/main">
+  <p:cSld>
+    <p:spTree>
+      <p:nvGrpSpPr>
+        <p:cNvPr id="1" name=""/>
+        <p:cNvGrpSpPr/>
+        <p:nvPr/>
+      </p:nvGrpSpPr>
+      <p:grpSpPr>
+        <a:xfrm>
+          <a:off x="0" y="0"/>
+          <a:ext cx="0" cy="0"/>
+          <a:chOff x="0" y="0"/>
+          <a:chExt cx="0" cy="0"/>
+        </a:xfrm>
+      </p:grpSpPr>
+      <p:sp>
+        <p:nvSpPr>
+          <p:cNvPr id="2" name="Title 1"/>
+          <p:cNvSpPr>
+            <a:spLocks noGrp="1"/>
+          </p:cNvSpPr>
+          <p:nvPr>
+            <p:ph type="title"/>
+          </p:nvPr>
+        </p:nvSpPr>
+        <p:spPr/>
+        <p:txBody>
+          <a:bodyPr/>
+          <a:lstStyle/>
+          <a:p>
+            <a:r>
+              <a:rPr lang="en-US" dirty="0" smtClean="0"/>
+              <a:t>Security TF Tasks</a:t>
+            </a:r>
+            <a:endParaRPr lang="en-US" dirty="0"/>
+          </a:p>
+        </p:txBody>
+      </p:sp>
+      <p:sp>
+        <p:nvSpPr>
+          <p:cNvPr id="3" name="Content Placeholder 2"/>
+          <p:cNvSpPr>
+            <a:spLocks noGrp="1"/>
+          </p:cNvSpPr>
+          <p:nvPr>
+            <p:ph idx="1"/>
+          </p:nvPr>
+        </p:nvSpPr>
+        <p:spPr/>
+        <p:txBody>
+          <a:bodyPr/>
+          <a:lstStyle/>
+          <a:p>
+            <a:r>
+              <a:rPr lang="en-US" dirty="0" smtClean="0"/>
+              <a:t>Recommended Security Practices for </a:t>
+            </a:r>
+            <a:r>
+              <a:rPr lang="en-US" dirty="0" err="1" smtClean="0"/>
+              <a:t>WoT</a:t>
+            </a:r>
+            <a:endParaRPr lang="en-US" dirty="0" smtClean="0"/>
+          </a:p>
+          <a:p>
+            <a:pPr lvl="1"/>
+            <a:r>
+              <a:rPr lang="en-US" dirty="0" smtClean="0"/>
+              <a:t>Just because we can describe it in a TD doesn’t mean it is good for new devices.</a:t>
+            </a:r>
+          </a:p>
+          <a:p>
+            <a:pPr lvl="1"/>
+            <a:r>
+              <a:rPr lang="en-US" smtClean="0"/>
+              <a:t>Brownfield issue</a:t>
+            </a:r>
+            <a:r>
+              <a:rPr lang="en-US" dirty="0" smtClean="0"/>
+              <a:t>: poor security in existing IoT devices.</a:t>
+            </a:r>
+          </a:p>
+          <a:p>
+            <a:r>
+              <a:rPr lang="en-US" dirty="0" smtClean="0"/>
+              <a:t>Testing</a:t>
+            </a:r>
+          </a:p>
+          <a:p>
+            <a:pPr lvl="1"/>
+            <a:r>
+              <a:rPr lang="en-US" dirty="0" smtClean="0"/>
+              <a:t>Penetration testing</a:t>
+            </a:r>
+          </a:p>
+          <a:p>
+            <a:r>
+              <a:rPr lang="en-US" dirty="0" smtClean="0"/>
+              <a:t>Interoperability</a:t>
+            </a:r>
+            <a:endParaRPr lang="en-US" dirty="0"/>
+          </a:p>
+        </p:txBody>
+      </p:sp>
+    </p:spTree>
+    <p:extLst>
+      <p:ext uri="{BB962C8B-B14F-4D97-AF65-F5344CB8AC3E}">
+        <p14:creationId xmlns:p14="http://schemas.microsoft.com/office/powerpoint/2010/main" val="2814912076"/>
+      </p:ext>
+    </p:extLst>
+  </p:cSld>
+  <p:clrMapOvr>
+    <a:masterClrMapping/>
+  </p:clrMapOvr>
+</p:sld>
+</file>
+
 <file path=ppt/slides/slide2.xml><?xml version="1.0" encoding="utf-8"?>
 <p:sld xmlns:a="http://schemas.openxmlformats.org/drawingml/2006/main" xmlns:r="http://schemas.openxmlformats.org/officeDocument/2006/relationships" xmlns:p="http://schemas.openxmlformats.org/presentationml/2006/main">
   <p:cSld>
@@ -3244,30 +3512,13 @@
             </a:r>
             <a:r>
               <a:rPr lang="en-US" dirty="0" smtClean="0"/>
-              <a:t> w.r.t </a:t>
-            </a:r>
-            <a:r>
-              <a:rPr lang="en-US" dirty="0" smtClean="0"/>
-              <a:t>Security goals</a:t>
-            </a:r>
-            <a:endParaRPr lang="en-US" dirty="0" smtClean="0"/>
-          </a:p>
-          <a:p>
-            <a:r>
-              <a:rPr lang="en-US" dirty="0" smtClean="0"/>
-              <a:t>The slides are to be continually updated (mostly in the scope of </a:t>
-            </a:r>
-            <a:r>
-              <a:rPr lang="en-US" dirty="0" smtClean="0"/>
-              <a:t>Security TF </a:t>
-            </a:r>
-            <a:r>
-              <a:rPr lang="en-US" dirty="0" smtClean="0"/>
-              <a:t>Web meetings</a:t>
-            </a:r>
-            <a:r>
-              <a:rPr lang="en-US" dirty="0" smtClean="0"/>
-              <a:t>)</a:t>
+              <a:t> w.r.t Security goals</a:t>
+            </a:r>
+          </a:p>
+          <a:p>
+            <a:r>
+              <a:rPr lang="en-US" dirty="0" smtClean="0"/>
+              <a:t>The slides are to be continually updated (mostly in the scope of Security TF Web meetings)</a:t>
             </a:r>
             <a:endParaRPr lang="de-DE" dirty="0"/>
           </a:p>
@@ -3353,7 +3604,6 @@
               <a:rPr lang="en-US" dirty="0" smtClean="0"/>
               <a:t> Charter states:</a:t>
             </a:r>
-            <a:endParaRPr lang="en-US" dirty="0" smtClean="0"/>
           </a:p>
           <a:p>
             <a:pPr marL="904875" lvl="1" indent="-457200"/>
@@ -3408,7 +3658,6 @@
               <a:rPr lang="en-US" dirty="0"/>
               <a:t>will only recommend an implementation of the proposed standards for use in production once it has passed such testing.</a:t>
             </a:r>
-            <a:endParaRPr lang="en-US" dirty="0"/>
           </a:p>
         </p:txBody>
       </p:sp>
@@ -3723,7 +3972,7 @@
         <p:spPr/>
         <p:txBody>
           <a:bodyPr>
-            <a:normAutofit/>
+            <a:normAutofit lnSpcReduction="10000"/>
           </a:bodyPr>
           <a:lstStyle/>
           <a:p>
@@ -3735,15 +3984,38 @@
           <a:p>
             <a:r>
               <a:rPr lang="en-US" dirty="0" smtClean="0"/>
-              <a:t>Implementations should allow self-signed certificates</a:t>
-            </a:r>
+              <a:t>Implementations should allow self-signed </a:t>
+            </a:r>
+            <a:r>
+              <a:rPr lang="en-US" dirty="0" smtClean="0"/>
+              <a:t>certificates</a:t>
+            </a:r>
+          </a:p>
+          <a:p>
+            <a:pPr lvl="1"/>
+            <a:r>
+              <a:rPr lang="en-US" dirty="0" smtClean="0"/>
+              <a:t>But can we put some other information in the cert we can validate?  Ex: the id containe</a:t>
+            </a:r>
+            <a:r>
+              <a:rPr lang="en-US" dirty="0" smtClean="0"/>
+              <a:t>d in the TD; but, </a:t>
+            </a:r>
+            <a:r>
+              <a:rPr lang="en-US" dirty="0" err="1" smtClean="0"/>
+              <a:t>spoofable</a:t>
+            </a:r>
+            <a:r>
+              <a:rPr lang="en-US" dirty="0" smtClean="0"/>
+              <a:t>… </a:t>
+            </a:r>
+            <a:endParaRPr lang="en-US" dirty="0" smtClean="0"/>
           </a:p>
           <a:p>
             <a:r>
               <a:rPr lang="en-US" dirty="0" smtClean="0"/>
               <a:t>Intel proxy actually supports an external CA for its certificate (it will run on an external cloud server)</a:t>
             </a:r>
-            <a:endParaRPr lang="en-US" dirty="0" smtClean="0"/>
           </a:p>
           <a:p>
             <a:endParaRPr lang="de-DE" dirty="0"/>
@@ -3963,7 +4235,6 @@
               <a:rPr lang="en-US" dirty="0" smtClean="0"/>
               <a:t>Can also be used for Thing Directory</a:t>
             </a:r>
-            <a:endParaRPr lang="en-US" dirty="0" smtClean="0"/>
           </a:p>
           <a:p>
             <a:endParaRPr lang="en-US" dirty="0"/>
@@ -4071,19 +4342,27 @@
             <a:pPr lvl="1"/>
             <a:r>
               <a:rPr lang="en-US" dirty="0" smtClean="0"/>
-              <a:t>DLTS, ACLs, </a:t>
+              <a:t>DTLS</a:t>
+            </a:r>
+            <a:r>
+              <a:rPr lang="en-US" dirty="0" smtClean="0"/>
+              <a:t>, ACLs, </a:t>
+            </a:r>
+            <a:r>
+              <a:rPr lang="en-US" dirty="0" smtClean="0"/>
+              <a:t>OAuth</a:t>
+            </a:r>
+            <a:r>
+              <a:rPr lang="en-US" dirty="0" smtClean="0"/>
+              <a:t>, etc. etc. important but can be left to </a:t>
+            </a:r>
+            <a:r>
+              <a:rPr lang="en-US" dirty="0" smtClean="0"/>
+              <a:t>TPAC </a:t>
             </a:r>
             <a:r>
               <a:rPr lang="en-US" dirty="0" err="1" smtClean="0"/>
-              <a:t>Oauth</a:t>
-            </a:r>
-            <a:r>
-              <a:rPr lang="en-US" dirty="0" smtClean="0"/>
-              <a:t>, etc. etc. important but can be left to future </a:t>
-            </a:r>
-            <a:r>
-              <a:rPr lang="en-US" dirty="0" err="1" smtClean="0"/>
-              <a:t>plugfests</a:t>
+              <a:t>plugfest</a:t>
             </a:r>
             <a:endParaRPr lang="en-US" dirty="0" smtClean="0"/>
           </a:p>

</xml_diff>